<commit_message>
New conntrack system slides;
</commit_message>
<xml_diff>
--- a/netfilter/netfilter.pptx
+++ b/netfilter/netfilter.pptx
@@ -123,7 +123,40 @@
 </file>
 
 <file path=ppt/revisionInfo.xml><?xml version="1.0" encoding="utf-8"?>
-<p1510:revInfo xmlns:a="http://schemas.openxmlformats.org/drawingml/2006/main" xmlns:r="http://schemas.openxmlformats.org/officeDocument/2006/relationships" xmlns:p1510="http://schemas.microsoft.com/office/powerpoint/2015/10/main"/>
+<p1510:revInfo xmlns:a="http://schemas.openxmlformats.org/drawingml/2006/main" xmlns:r="http://schemas.openxmlformats.org/officeDocument/2006/relationships" xmlns:p1510="http://schemas.microsoft.com/office/powerpoint/2015/10/main">
+  <p1510:revLst>
+    <p1510:client id="{9DE47504-0A78-49D6-BFF2-2C183765402D}" v="3" dt="2019-01-11T10:21:17.409"/>
+  </p1510:revLst>
+</p1510:revInfo>
+</file>
+
+<file path=ppt/changesInfos/changesInfo1.xml><?xml version="1.0" encoding="utf-8"?>
+<pc:chgInfo xmlns:a="http://schemas.openxmlformats.org/drawingml/2006/main" xmlns:r="http://schemas.openxmlformats.org/officeDocument/2006/relationships" xmlns:ac="http://schemas.microsoft.com/office/drawing/2013/main/command" xmlns:pc="http://schemas.microsoft.com/office/powerpoint/2013/main/command">
+  <pc:docChgLst>
+    <pc:chgData name="Jinqing Yan" userId="b38728bc-07b0-4042-9de7-2af5f63a681d" providerId="ADAL" clId="{9DE47504-0A78-49D6-BFF2-2C183765402D}"/>
+    <pc:docChg chg="custSel modSld">
+      <pc:chgData name="Jinqing Yan" userId="b38728bc-07b0-4042-9de7-2af5f63a681d" providerId="ADAL" clId="{9DE47504-0A78-49D6-BFF2-2C183765402D}" dt="2019-01-11T10:21:17.380" v="3" actId="20577"/>
+      <pc:docMkLst>
+        <pc:docMk/>
+      </pc:docMkLst>
+      <pc:sldChg chg="modSp">
+        <pc:chgData name="Jinqing Yan" userId="b38728bc-07b0-4042-9de7-2af5f63a681d" providerId="ADAL" clId="{9DE47504-0A78-49D6-BFF2-2C183765402D}" dt="2019-01-11T10:21:17.380" v="3" actId="20577"/>
+        <pc:sldMkLst>
+          <pc:docMk/>
+          <pc:sldMk cId="1799823002" sldId="262"/>
+        </pc:sldMkLst>
+        <pc:spChg chg="mod">
+          <ac:chgData name="Jinqing Yan" userId="b38728bc-07b0-4042-9de7-2af5f63a681d" providerId="ADAL" clId="{9DE47504-0A78-49D6-BFF2-2C183765402D}" dt="2019-01-11T10:21:17.380" v="3" actId="20577"/>
+          <ac:spMkLst>
+            <pc:docMk/>
+            <pc:sldMk cId="1799823002" sldId="262"/>
+            <ac:spMk id="3" creationId="{AEE113CF-FFDC-4266-89D8-2515EBBC2D9F}"/>
+          </ac:spMkLst>
+        </pc:spChg>
+      </pc:sldChg>
+    </pc:docChg>
+  </pc:docChgLst>
+</pc:chgInfo>
 </file>
 
 <file path=ppt/notesMasters/notesMaster1.xml><?xml version="1.0" encoding="utf-8"?>
@@ -208,7 +241,7 @@
           <a:p>
             <a:fld id="{50B7E428-205A-45CE-A1E2-B0113790CC99}" type="datetimeFigureOut">
               <a:rPr lang="en-US" smtClean="0"/>
-              <a:t>12/8/2017</a:t>
+              <a:t>1/10/2019</a:t>
             </a:fld>
             <a:endParaRPr lang="en-US"/>
           </a:p>
@@ -622,7 +655,7 @@
           <a:p>
             <a:fld id="{ADE239C1-DCD7-4059-B94C-A4D1A1BC9B8B}" type="datetime1">
               <a:rPr lang="en-US" smtClean="0"/>
-              <a:t>12/8/2017</a:t>
+              <a:t>1/10/2019</a:t>
             </a:fld>
             <a:endParaRPr lang="en-US"/>
           </a:p>
@@ -823,7 +856,7 @@
           <a:p>
             <a:fld id="{BF9CFC4E-B778-44F1-A415-EC88A0A9AB21}" type="datetime1">
               <a:rPr lang="en-US" smtClean="0"/>
-              <a:t>12/8/2017</a:t>
+              <a:t>1/10/2019</a:t>
             </a:fld>
             <a:endParaRPr lang="en-US"/>
           </a:p>
@@ -1034,7 +1067,7 @@
           <a:p>
             <a:fld id="{E4C1D400-792C-4B64-B804-CFBA8EA7BA2E}" type="datetime1">
               <a:rPr lang="en-US" smtClean="0"/>
-              <a:t>12/8/2017</a:t>
+              <a:t>1/10/2019</a:t>
             </a:fld>
             <a:endParaRPr lang="en-US"/>
           </a:p>
@@ -1235,7 +1268,7 @@
           <a:p>
             <a:fld id="{7AA623CD-4C06-40E6-96A0-8E43C1F3AF07}" type="datetime1">
               <a:rPr lang="en-US" smtClean="0"/>
-              <a:t>12/8/2017</a:t>
+              <a:t>1/10/2019</a:t>
             </a:fld>
             <a:endParaRPr lang="en-US"/>
           </a:p>
@@ -1513,7 +1546,7 @@
           <a:p>
             <a:fld id="{7B7BD4B4-EC12-44EC-B6A8-C4002D7179C1}" type="datetime1">
               <a:rPr lang="en-US" smtClean="0"/>
-              <a:t>12/8/2017</a:t>
+              <a:t>1/10/2019</a:t>
             </a:fld>
             <a:endParaRPr lang="en-US"/>
           </a:p>
@@ -1781,7 +1814,7 @@
           <a:p>
             <a:fld id="{D3236D07-83A0-43B0-8D02-1C51466D1CEA}" type="datetime1">
               <a:rPr lang="en-US" smtClean="0"/>
-              <a:t>12/8/2017</a:t>
+              <a:t>1/10/2019</a:t>
             </a:fld>
             <a:endParaRPr lang="en-US"/>
           </a:p>
@@ -2196,7 +2229,7 @@
           <a:p>
             <a:fld id="{4172CBF6-9798-4394-9C66-B0BADBA9BEDF}" type="datetime1">
               <a:rPr lang="en-US" smtClean="0"/>
-              <a:t>12/8/2017</a:t>
+              <a:t>1/10/2019</a:t>
             </a:fld>
             <a:endParaRPr lang="en-US"/>
           </a:p>
@@ -2340,7 +2373,7 @@
           <a:p>
             <a:fld id="{69808DFE-7A75-4500-B439-F2C96ED241E4}" type="datetime1">
               <a:rPr lang="en-US" smtClean="0"/>
-              <a:t>12/8/2017</a:t>
+              <a:t>1/10/2019</a:t>
             </a:fld>
             <a:endParaRPr lang="en-US"/>
           </a:p>
@@ -2456,7 +2489,7 @@
           <a:p>
             <a:fld id="{29CFAC3A-D088-41BB-B4FD-D5D48DD890FE}" type="datetime1">
               <a:rPr lang="en-US" smtClean="0"/>
-              <a:t>12/8/2017</a:t>
+              <a:t>1/10/2019</a:t>
             </a:fld>
             <a:endParaRPr lang="en-US"/>
           </a:p>
@@ -2770,7 +2803,7 @@
           <a:p>
             <a:fld id="{586A3517-7B25-461D-8275-2417CACA8AAE}" type="datetime1">
               <a:rPr lang="en-US" smtClean="0"/>
-              <a:t>12/8/2017</a:t>
+              <a:t>1/10/2019</a:t>
             </a:fld>
             <a:endParaRPr lang="en-US"/>
           </a:p>
@@ -3061,7 +3094,7 @@
           <a:p>
             <a:fld id="{3A90DD31-D91D-4DA6-A934-D56A862BC8CB}" type="datetime1">
               <a:rPr lang="en-US" smtClean="0"/>
-              <a:t>12/8/2017</a:t>
+              <a:t>1/10/2019</a:t>
             </a:fld>
             <a:endParaRPr lang="en-US"/>
           </a:p>
@@ -3305,7 +3338,7 @@
           <a:p>
             <a:fld id="{3714393E-0ECF-470F-BA30-93139845FCB9}" type="datetime1">
               <a:rPr lang="en-US" smtClean="0"/>
-              <a:t>12/8/2017</a:t>
+              <a:t>1/10/2019</a:t>
             </a:fld>
             <a:endParaRPr lang="en-US"/>
           </a:p>
@@ -3783,7 +3816,7 @@
           <a:p>
             <a:fld id="{7AA623CD-4C06-40E6-96A0-8E43C1F3AF07}" type="datetime1">
               <a:rPr lang="en-US" smtClean="0"/>
-              <a:t>12/8/2017</a:t>
+              <a:t>1/10/2019</a:t>
             </a:fld>
             <a:endParaRPr lang="en-US"/>
           </a:p>
@@ -4085,7 +4118,7 @@
           <a:p>
             <a:fld id="{7AA623CD-4C06-40E6-96A0-8E43C1F3AF07}" type="datetime1">
               <a:rPr lang="en-US" smtClean="0"/>
-              <a:t>12/8/2017</a:t>
+              <a:t>1/10/2019</a:t>
             </a:fld>
             <a:endParaRPr lang="en-US" dirty="0"/>
           </a:p>
@@ -5380,7 +5413,7 @@
           <a:p>
             <a:fld id="{E498BE7E-1DEA-43BF-AFFD-1373983ED1E9}" type="datetime1">
               <a:rPr lang="en-US" smtClean="0"/>
-              <a:t>12/8/2017</a:t>
+              <a:t>1/10/2019</a:t>
             </a:fld>
             <a:endParaRPr lang="en-US"/>
           </a:p>
@@ -5533,7 +5566,7 @@
         </p:spPr>
         <p:txBody>
           <a:bodyPr>
-            <a:normAutofit fontScale="92500" lnSpcReduction="10000"/>
+            <a:normAutofit fontScale="92500" lnSpcReduction="20000"/>
           </a:bodyPr>
           <a:lstStyle/>
           <a:p>
@@ -5620,6 +5653,24 @@
               </a:rPr>
               <a:t>http://www.iptables.info/en/index.html</a:t>
             </a:r>
+            <a:endParaRPr lang="en-US" dirty="0"/>
+          </a:p>
+          <a:p>
+            <a:pPr marL="0" indent="0">
+              <a:buNone/>
+            </a:pPr>
+            <a:r>
+              <a:rPr lang="en-US" dirty="0">
+                <a:hlinkClick r:id="rId3"/>
+              </a:rPr>
+              <a:t>https://www.frozentux.net/iptables-tutorial/chunkyhtml/index.html</a:t>
+            </a:r>
+            <a:endParaRPr lang="en-US" dirty="0"/>
+          </a:p>
+          <a:p>
+            <a:pPr marL="0" indent="0">
+              <a:buNone/>
+            </a:pPr>
             <a:endParaRPr lang="en-US" dirty="0"/>
           </a:p>
           <a:p>
@@ -5653,7 +5704,7 @@
           <a:p>
             <a:fld id="{7AA623CD-4C06-40E6-96A0-8E43C1F3AF07}" type="datetime1">
               <a:rPr lang="en-US" smtClean="0"/>
-              <a:t>12/8/2017</a:t>
+              <a:t>1/11/2019</a:t>
             </a:fld>
             <a:endParaRPr lang="en-US" dirty="0"/>
           </a:p>
@@ -7230,7 +7281,7 @@
           <a:p>
             <a:fld id="{4A939369-D3C1-4F93-A0F1-E23C7766DD62}" type="datetime1">
               <a:rPr lang="en-US" smtClean="0"/>
-              <a:t>12/8/2017</a:t>
+              <a:t>1/10/2019</a:t>
             </a:fld>
             <a:endParaRPr lang="en-US"/>
           </a:p>
@@ -8804,7 +8855,7 @@
           <a:p>
             <a:fld id="{7AA623CD-4C06-40E6-96A0-8E43C1F3AF07}" type="datetime1">
               <a:rPr lang="en-US" smtClean="0"/>
-              <a:t>12/8/2017</a:t>
+              <a:t>1/10/2019</a:t>
             </a:fld>
             <a:endParaRPr lang="en-US" dirty="0"/>
           </a:p>
@@ -12993,7 +13044,7 @@
           <a:p>
             <a:fld id="{12D2C9CA-69E4-4C29-BA34-FBBD17854F17}" type="datetime1">
               <a:rPr lang="en-US" smtClean="0"/>
-              <a:t>12/8/2017</a:t>
+              <a:t>1/10/2019</a:t>
             </a:fld>
             <a:endParaRPr lang="en-US"/>
           </a:p>
@@ -13077,7 +13128,7 @@
         <a:sysClr val="windowText" lastClr="000000"/>
       </a:dk1>
       <a:lt1>
-        <a:sysClr val="window" lastClr="CCE8CF"/>
+        <a:sysClr val="window" lastClr="FFFFFF"/>
       </a:lt1>
       <a:dk2>
         <a:srgbClr val="44546A"/>
@@ -13372,7 +13423,7 @@
         <a:sysClr val="windowText" lastClr="000000"/>
       </a:dk1>
       <a:lt1>
-        <a:sysClr val="window" lastClr="CCE8CF"/>
+        <a:sysClr val="window" lastClr="FFFFFF"/>
       </a:lt1>
       <a:dk2>
         <a:srgbClr val="44546A"/>

</xml_diff>